<commit_message>
work on the zabbix presentation
</commit_message>
<xml_diff>
--- a/zabbix/zabbix.pptx
+++ b/zabbix/zabbix.pptx
@@ -5,12 +5,33 @@
     <p:sldMasterId id="2147483714" r:id="rId1"/>
   </p:sldMasterIdLst>
   <p:sldIdLst>
-    <p:sldId id="257" r:id="rId2"/>
-    <p:sldId id="256" r:id="rId3"/>
+    <p:sldId id="256" r:id="rId2"/>
+    <p:sldId id="257" r:id="rId3"/>
     <p:sldId id="258" r:id="rId4"/>
-    <p:sldId id="259" r:id="rId5"/>
-    <p:sldId id="260" r:id="rId6"/>
-    <p:sldId id="261" r:id="rId7"/>
+    <p:sldId id="262" r:id="rId5"/>
+    <p:sldId id="263" r:id="rId6"/>
+    <p:sldId id="264" r:id="rId7"/>
+    <p:sldId id="259" r:id="rId8"/>
+    <p:sldId id="260" r:id="rId9"/>
+    <p:sldId id="265" r:id="rId10"/>
+    <p:sldId id="266" r:id="rId11"/>
+    <p:sldId id="267" r:id="rId12"/>
+    <p:sldId id="261" r:id="rId13"/>
+    <p:sldId id="270" r:id="rId14"/>
+    <p:sldId id="268" r:id="rId15"/>
+    <p:sldId id="272" r:id="rId16"/>
+    <p:sldId id="269" r:id="rId17"/>
+    <p:sldId id="271" r:id="rId18"/>
+    <p:sldId id="273" r:id="rId19"/>
+    <p:sldId id="274" r:id="rId20"/>
+    <p:sldId id="275" r:id="rId21"/>
+    <p:sldId id="276" r:id="rId22"/>
+    <p:sldId id="277" r:id="rId23"/>
+    <p:sldId id="278" r:id="rId24"/>
+    <p:sldId id="279" r:id="rId25"/>
+    <p:sldId id="280" r:id="rId26"/>
+    <p:sldId id="281" r:id="rId27"/>
+    <p:sldId id="282" r:id="rId28"/>
   </p:sldIdLst>
   <p:sldSz cx="12192000" cy="6858000"/>
   <p:notesSz cx="6858000" cy="9144000"/>
@@ -109,6 +130,11 @@
       </a:defRPr>
     </a:lvl9pPr>
   </p:defaultTextStyle>
+  <p:extLst>
+    <p:ext uri="{EFAFB233-063F-42B5-8137-9DF3F51BA10A}">
+      <p15:sldGuideLst xmlns:p15="http://schemas.microsoft.com/office/powerpoint/2012/main"/>
+    </p:ext>
+  </p:extLst>
 </p:presentation>
 </file>
 
@@ -295,7 +321,7 @@
           <a:p>
             <a:fld id="{A0A74D43-18EA-4186-A357-28EC9CF695DB}" type="datetimeFigureOut">
               <a:rPr lang="en-US" smtClean="0"/>
-              <a:t>10/9/2019</a:t>
+              <a:t>10/16/2019</a:t>
             </a:fld>
             <a:endParaRPr lang="en-US"/>
           </a:p>
@@ -570,7 +596,7 @@
           <a:p>
             <a:fld id="{A0A74D43-18EA-4186-A357-28EC9CF695DB}" type="datetimeFigureOut">
               <a:rPr lang="en-US" smtClean="0"/>
-              <a:t>10/9/2019</a:t>
+              <a:t>10/16/2019</a:t>
             </a:fld>
             <a:endParaRPr lang="en-US"/>
           </a:p>
@@ -764,7 +790,7 @@
           <a:p>
             <a:fld id="{A0A74D43-18EA-4186-A357-28EC9CF695DB}" type="datetimeFigureOut">
               <a:rPr lang="en-US" smtClean="0"/>
-              <a:t>10/9/2019</a:t>
+              <a:t>10/16/2019</a:t>
             </a:fld>
             <a:endParaRPr lang="en-US"/>
           </a:p>
@@ -1032,7 +1058,7 @@
           <a:p>
             <a:fld id="{A0A74D43-18EA-4186-A357-28EC9CF695DB}" type="datetimeFigureOut">
               <a:rPr lang="en-US" smtClean="0"/>
-              <a:t>10/9/2019</a:t>
+              <a:t>10/16/2019</a:t>
             </a:fld>
             <a:endParaRPr lang="en-US"/>
           </a:p>
@@ -1364,7 +1390,7 @@
           <a:p>
             <a:fld id="{A0A74D43-18EA-4186-A357-28EC9CF695DB}" type="datetimeFigureOut">
               <a:rPr lang="en-US" smtClean="0"/>
-              <a:t>10/9/2019</a:t>
+              <a:t>10/16/2019</a:t>
             </a:fld>
             <a:endParaRPr lang="en-US"/>
           </a:p>
@@ -1974,7 +2000,7 @@
           <a:p>
             <a:fld id="{A0A74D43-18EA-4186-A357-28EC9CF695DB}" type="datetimeFigureOut">
               <a:rPr lang="en-US" smtClean="0"/>
-              <a:t>10/9/2019</a:t>
+              <a:t>10/16/2019</a:t>
             </a:fld>
             <a:endParaRPr lang="en-US"/>
           </a:p>
@@ -2821,7 +2847,7 @@
           <a:p>
             <a:fld id="{A0A74D43-18EA-4186-A357-28EC9CF695DB}" type="datetimeFigureOut">
               <a:rPr lang="en-US" smtClean="0"/>
-              <a:t>10/9/2019</a:t>
+              <a:t>10/16/2019</a:t>
             </a:fld>
             <a:endParaRPr lang="en-US"/>
           </a:p>
@@ -2991,7 +3017,7 @@
           <a:p>
             <a:fld id="{A0A74D43-18EA-4186-A357-28EC9CF695DB}" type="datetimeFigureOut">
               <a:rPr lang="en-US" smtClean="0"/>
-              <a:t>10/9/2019</a:t>
+              <a:t>10/16/2019</a:t>
             </a:fld>
             <a:endParaRPr lang="en-US"/>
           </a:p>
@@ -3171,7 +3197,7 @@
           <a:p>
             <a:fld id="{A0A74D43-18EA-4186-A357-28EC9CF695DB}" type="datetimeFigureOut">
               <a:rPr lang="en-US" smtClean="0"/>
-              <a:t>10/9/2019</a:t>
+              <a:t>10/16/2019</a:t>
             </a:fld>
             <a:endParaRPr lang="en-US"/>
           </a:p>
@@ -3341,7 +3367,7 @@
           <a:p>
             <a:fld id="{A0A74D43-18EA-4186-A357-28EC9CF695DB}" type="datetimeFigureOut">
               <a:rPr lang="en-US" smtClean="0"/>
-              <a:t>10/9/2019</a:t>
+              <a:t>10/16/2019</a:t>
             </a:fld>
             <a:endParaRPr lang="en-US"/>
           </a:p>
@@ -3585,7 +3611,7 @@
           <a:p>
             <a:fld id="{A0A74D43-18EA-4186-A357-28EC9CF695DB}" type="datetimeFigureOut">
               <a:rPr lang="en-US" smtClean="0"/>
-              <a:t>10/9/2019</a:t>
+              <a:t>10/16/2019</a:t>
             </a:fld>
             <a:endParaRPr lang="en-US"/>
           </a:p>
@@ -3877,7 +3903,7 @@
           <a:p>
             <a:fld id="{A0A74D43-18EA-4186-A357-28EC9CF695DB}" type="datetimeFigureOut">
               <a:rPr lang="en-US" smtClean="0"/>
-              <a:t>10/9/2019</a:t>
+              <a:t>10/16/2019</a:t>
             </a:fld>
             <a:endParaRPr lang="en-US"/>
           </a:p>
@@ -4315,7 +4341,7 @@
           <a:p>
             <a:fld id="{A0A74D43-18EA-4186-A357-28EC9CF695DB}" type="datetimeFigureOut">
               <a:rPr lang="en-US" smtClean="0"/>
-              <a:t>10/9/2019</a:t>
+              <a:t>10/16/2019</a:t>
             </a:fld>
             <a:endParaRPr lang="en-US"/>
           </a:p>
@@ -4433,7 +4459,7 @@
           <a:p>
             <a:fld id="{A0A74D43-18EA-4186-A357-28EC9CF695DB}" type="datetimeFigureOut">
               <a:rPr lang="en-US" smtClean="0"/>
-              <a:t>10/9/2019</a:t>
+              <a:t>10/16/2019</a:t>
             </a:fld>
             <a:endParaRPr lang="en-US"/>
           </a:p>
@@ -4528,7 +4554,7 @@
           <a:p>
             <a:fld id="{A0A74D43-18EA-4186-A357-28EC9CF695DB}" type="datetimeFigureOut">
               <a:rPr lang="en-US" smtClean="0"/>
-              <a:t>10/9/2019</a:t>
+              <a:t>10/16/2019</a:t>
             </a:fld>
             <a:endParaRPr lang="en-US"/>
           </a:p>
@@ -4807,7 +4833,7 @@
           <a:p>
             <a:fld id="{A0A74D43-18EA-4186-A357-28EC9CF695DB}" type="datetimeFigureOut">
               <a:rPr lang="en-US" smtClean="0"/>
-              <a:t>10/9/2019</a:t>
+              <a:t>10/16/2019</a:t>
             </a:fld>
             <a:endParaRPr lang="en-US"/>
           </a:p>
@@ -5082,7 +5108,7 @@
           <a:p>
             <a:fld id="{A0A74D43-18EA-4186-A357-28EC9CF695DB}" type="datetimeFigureOut">
               <a:rPr lang="en-US" smtClean="0"/>
-              <a:t>10/9/2019</a:t>
+              <a:t>10/16/2019</a:t>
             </a:fld>
             <a:endParaRPr lang="en-US"/>
           </a:p>
@@ -5511,7 +5537,7 @@
           <a:p>
             <a:fld id="{A0A74D43-18EA-4186-A357-28EC9CF695DB}" type="datetimeFigureOut">
               <a:rPr lang="en-US" smtClean="0"/>
-              <a:t>10/9/2019</a:t>
+              <a:t>10/16/2019</a:t>
             </a:fld>
             <a:endParaRPr lang="en-US"/>
           </a:p>
@@ -6014,6 +6040,847 @@
       </p:grpSpPr>
       <p:sp>
         <p:nvSpPr>
+          <p:cNvPr id="2" name="Title 1">
+            <a:extLst>
+              <a:ext uri="{FF2B5EF4-FFF2-40B4-BE49-F238E27FC236}">
+                <a16:creationId xmlns:a16="http://schemas.microsoft.com/office/drawing/2014/main" id="{9C40072D-784F-4A53-95BC-13C11F7F82F8}"/>
+              </a:ext>
+            </a:extLst>
+          </p:cNvPr>
+          <p:cNvSpPr>
+            <a:spLocks noGrp="1"/>
+          </p:cNvSpPr>
+          <p:nvPr>
+            <p:ph type="ctrTitle"/>
+          </p:nvPr>
+        </p:nvSpPr>
+        <p:spPr>
+          <a:xfrm>
+            <a:off x="712556" y="410527"/>
+            <a:ext cx="4207158" cy="1011315"/>
+          </a:xfrm>
+        </p:spPr>
+        <p:txBody>
+          <a:bodyPr/>
+          <a:lstStyle/>
+          <a:p>
+            <a:r>
+              <a:rPr lang="en-US" dirty="0"/>
+              <a:t>ZABBIX</a:t>
+            </a:r>
+          </a:p>
+        </p:txBody>
+      </p:sp>
+      <p:sp>
+        <p:nvSpPr>
+          <p:cNvPr id="3" name="Subtitle 2">
+            <a:extLst>
+              <a:ext uri="{FF2B5EF4-FFF2-40B4-BE49-F238E27FC236}">
+                <a16:creationId xmlns:a16="http://schemas.microsoft.com/office/drawing/2014/main" id="{39E9CC7C-B571-4717-8C40-BBECA664A0B5}"/>
+              </a:ext>
+            </a:extLst>
+          </p:cNvPr>
+          <p:cNvSpPr>
+            <a:spLocks noGrp="1"/>
+          </p:cNvSpPr>
+          <p:nvPr>
+            <p:ph type="subTitle" idx="1"/>
+          </p:nvPr>
+        </p:nvSpPr>
+        <p:spPr>
+          <a:xfrm>
+            <a:off x="506885" y="4713179"/>
+            <a:ext cx="8825658" cy="494926"/>
+          </a:xfrm>
+        </p:spPr>
+        <p:txBody>
+          <a:bodyPr>
+            <a:normAutofit lnSpcReduction="10000"/>
+          </a:bodyPr>
+          <a:lstStyle/>
+          <a:p>
+            <a:r>
+              <a:rPr lang="en-US" sz="2800" b="1" dirty="0"/>
+              <a:t>Let’s talk about metrics</a:t>
+            </a:r>
+          </a:p>
+        </p:txBody>
+      </p:sp>
+    </p:spTree>
+    <p:extLst>
+      <p:ext uri="{BB962C8B-B14F-4D97-AF65-F5344CB8AC3E}">
+        <p14:creationId xmlns:p14="http://schemas.microsoft.com/office/powerpoint/2010/main" val="2008311757"/>
+      </p:ext>
+    </p:extLst>
+  </p:cSld>
+  <p:clrMapOvr>
+    <a:masterClrMapping/>
+  </p:clrMapOvr>
+</p:sld>
+</file>
+
+<file path=ppt/slides/slide10.xml><?xml version="1.0" encoding="utf-8"?>
+<p:sld xmlns:a="http://schemas.openxmlformats.org/drawingml/2006/main" xmlns:r="http://schemas.openxmlformats.org/officeDocument/2006/relationships" xmlns:p="http://schemas.openxmlformats.org/presentationml/2006/main">
+  <p:cSld>
+    <p:spTree>
+      <p:nvGrpSpPr>
+        <p:cNvPr id="1" name=""/>
+        <p:cNvGrpSpPr/>
+        <p:nvPr/>
+      </p:nvGrpSpPr>
+      <p:grpSpPr>
+        <a:xfrm>
+          <a:off x="0" y="0"/>
+          <a:ext cx="0" cy="0"/>
+          <a:chOff x="0" y="0"/>
+          <a:chExt cx="0" cy="0"/>
+        </a:xfrm>
+      </p:grpSpPr>
+      <p:sp>
+        <p:nvSpPr>
+          <p:cNvPr id="3" name="Subtitle 2">
+            <a:extLst>
+              <a:ext uri="{FF2B5EF4-FFF2-40B4-BE49-F238E27FC236}">
+                <a16:creationId xmlns:a16="http://schemas.microsoft.com/office/drawing/2014/main" id="{39E9CC7C-B571-4717-8C40-BBECA664A0B5}"/>
+              </a:ext>
+            </a:extLst>
+          </p:cNvPr>
+          <p:cNvSpPr>
+            <a:spLocks noGrp="1"/>
+          </p:cNvSpPr>
+          <p:nvPr>
+            <p:ph type="subTitle" idx="1"/>
+          </p:nvPr>
+        </p:nvSpPr>
+        <p:spPr>
+          <a:xfrm>
+            <a:off x="520137" y="485735"/>
+            <a:ext cx="8825658" cy="6201392"/>
+          </a:xfrm>
+        </p:spPr>
+        <p:txBody>
+          <a:bodyPr>
+            <a:normAutofit/>
+          </a:bodyPr>
+          <a:lstStyle/>
+          <a:p>
+            <a:r>
+              <a:rPr lang="en-US" sz="4000" b="1" dirty="0"/>
+              <a:t>Let’s talk about metrics</a:t>
+            </a:r>
+          </a:p>
+          <a:p>
+            <a:pPr marL="571500" indent="-571500">
+              <a:buFont typeface="Arial" panose="020B0604020202020204" pitchFamily="34" charset="0"/>
+              <a:buChar char="•"/>
+            </a:pPr>
+            <a:endParaRPr lang="ru-RU" sz="2400" b="1" dirty="0"/>
+          </a:p>
+          <a:p>
+            <a:pPr marL="571500" indent="-571500">
+              <a:buFont typeface="Arial" panose="020B0604020202020204" pitchFamily="34" charset="0"/>
+              <a:buChar char="•"/>
+            </a:pPr>
+            <a:r>
+              <a:rPr lang="ru-RU" sz="2400" b="1" dirty="0"/>
+              <a:t>Что такое метрики?</a:t>
+            </a:r>
+          </a:p>
+          <a:p>
+            <a:pPr marL="571500" indent="-571500">
+              <a:buFont typeface="Arial" panose="020B0604020202020204" pitchFamily="34" charset="0"/>
+              <a:buChar char="•"/>
+            </a:pPr>
+            <a:r>
+              <a:rPr lang="ru-RU" sz="2400" b="1" dirty="0"/>
+              <a:t>Зачем они нужны?</a:t>
+            </a:r>
+          </a:p>
+          <a:p>
+            <a:pPr marL="571500" indent="-571500">
+              <a:buFont typeface="Arial" panose="020B0604020202020204" pitchFamily="34" charset="0"/>
+              <a:buChar char="•"/>
+            </a:pPr>
+            <a:r>
+              <a:rPr lang="ru-RU" sz="2400" b="1" dirty="0"/>
+              <a:t>Как метрики существуют?</a:t>
+            </a:r>
+          </a:p>
+        </p:txBody>
+      </p:sp>
+    </p:spTree>
+    <p:extLst>
+      <p:ext uri="{BB962C8B-B14F-4D97-AF65-F5344CB8AC3E}">
+        <p14:creationId xmlns:p14="http://schemas.microsoft.com/office/powerpoint/2010/main" val="2391138305"/>
+      </p:ext>
+    </p:extLst>
+  </p:cSld>
+  <p:clrMapOvr>
+    <a:masterClrMapping/>
+  </p:clrMapOvr>
+</p:sld>
+</file>
+
+<file path=ppt/slides/slide11.xml><?xml version="1.0" encoding="utf-8"?>
+<p:sld xmlns:a="http://schemas.openxmlformats.org/drawingml/2006/main" xmlns:r="http://schemas.openxmlformats.org/officeDocument/2006/relationships" xmlns:p="http://schemas.openxmlformats.org/presentationml/2006/main">
+  <p:cSld>
+    <p:spTree>
+      <p:nvGrpSpPr>
+        <p:cNvPr id="1" name=""/>
+        <p:cNvGrpSpPr/>
+        <p:nvPr/>
+      </p:nvGrpSpPr>
+      <p:grpSpPr>
+        <a:xfrm>
+          <a:off x="0" y="0"/>
+          <a:ext cx="0" cy="0"/>
+          <a:chOff x="0" y="0"/>
+          <a:chExt cx="0" cy="0"/>
+        </a:xfrm>
+      </p:grpSpPr>
+      <p:sp>
+        <p:nvSpPr>
+          <p:cNvPr id="3" name="Subtitle 2">
+            <a:extLst>
+              <a:ext uri="{FF2B5EF4-FFF2-40B4-BE49-F238E27FC236}">
+                <a16:creationId xmlns:a16="http://schemas.microsoft.com/office/drawing/2014/main" id="{39E9CC7C-B571-4717-8C40-BBECA664A0B5}"/>
+              </a:ext>
+            </a:extLst>
+          </p:cNvPr>
+          <p:cNvSpPr>
+            <a:spLocks noGrp="1"/>
+          </p:cNvSpPr>
+          <p:nvPr>
+            <p:ph type="subTitle" idx="1"/>
+          </p:nvPr>
+        </p:nvSpPr>
+        <p:spPr>
+          <a:xfrm>
+            <a:off x="520137" y="485735"/>
+            <a:ext cx="8825658" cy="6201392"/>
+          </a:xfrm>
+        </p:spPr>
+        <p:txBody>
+          <a:bodyPr>
+            <a:normAutofit/>
+          </a:bodyPr>
+          <a:lstStyle/>
+          <a:p>
+            <a:r>
+              <a:rPr lang="en-US" sz="4000" b="1" dirty="0"/>
+              <a:t>Let’s talk about metrics</a:t>
+            </a:r>
+          </a:p>
+          <a:p>
+            <a:pPr marL="571500" indent="-571500">
+              <a:buFont typeface="Arial" panose="020B0604020202020204" pitchFamily="34" charset="0"/>
+              <a:buChar char="•"/>
+            </a:pPr>
+            <a:endParaRPr lang="ru-RU" sz="2400" b="1" dirty="0"/>
+          </a:p>
+          <a:p>
+            <a:pPr marL="571500" indent="-571500">
+              <a:buFont typeface="Arial" panose="020B0604020202020204" pitchFamily="34" charset="0"/>
+              <a:buChar char="•"/>
+            </a:pPr>
+            <a:r>
+              <a:rPr lang="ru-RU" sz="2400" b="1" dirty="0"/>
+              <a:t>Что такое метрики?</a:t>
+            </a:r>
+          </a:p>
+          <a:p>
+            <a:pPr marL="571500" indent="-571500">
+              <a:buFont typeface="Arial" panose="020B0604020202020204" pitchFamily="34" charset="0"/>
+              <a:buChar char="•"/>
+            </a:pPr>
+            <a:r>
+              <a:rPr lang="ru-RU" sz="2400" b="1" dirty="0"/>
+              <a:t>Зачем они нужны?</a:t>
+            </a:r>
+          </a:p>
+          <a:p>
+            <a:pPr marL="571500" indent="-571500">
+              <a:buFont typeface="Arial" panose="020B0604020202020204" pitchFamily="34" charset="0"/>
+              <a:buChar char="•"/>
+            </a:pPr>
+            <a:r>
+              <a:rPr lang="ru-RU" sz="2400" b="1" dirty="0"/>
+              <a:t>Как метрики существуют?</a:t>
+            </a:r>
+          </a:p>
+          <a:p>
+            <a:pPr marL="571500" indent="-571500">
+              <a:buFont typeface="Arial" panose="020B0604020202020204" pitchFamily="34" charset="0"/>
+              <a:buChar char="•"/>
+            </a:pPr>
+            <a:r>
+              <a:rPr lang="ru-RU" sz="2400" b="1" dirty="0"/>
+              <a:t>Какие проболемы они решают?</a:t>
+            </a:r>
+            <a:endParaRPr lang="en-US" b="1" dirty="0"/>
+          </a:p>
+        </p:txBody>
+      </p:sp>
+    </p:spTree>
+    <p:extLst>
+      <p:ext uri="{BB962C8B-B14F-4D97-AF65-F5344CB8AC3E}">
+        <p14:creationId xmlns:p14="http://schemas.microsoft.com/office/powerpoint/2010/main" val="2033355023"/>
+      </p:ext>
+    </p:extLst>
+  </p:cSld>
+  <p:clrMapOvr>
+    <a:masterClrMapping/>
+  </p:clrMapOvr>
+</p:sld>
+</file>
+
+<file path=ppt/slides/slide12.xml><?xml version="1.0" encoding="utf-8"?>
+<p:sld xmlns:a="http://schemas.openxmlformats.org/drawingml/2006/main" xmlns:r="http://schemas.openxmlformats.org/officeDocument/2006/relationships" xmlns:p="http://schemas.openxmlformats.org/presentationml/2006/main">
+  <p:cSld>
+    <p:spTree>
+      <p:nvGrpSpPr>
+        <p:cNvPr id="1" name=""/>
+        <p:cNvGrpSpPr/>
+        <p:nvPr/>
+      </p:nvGrpSpPr>
+      <p:grpSpPr>
+        <a:xfrm>
+          <a:off x="0" y="0"/>
+          <a:ext cx="0" cy="0"/>
+          <a:chOff x="0" y="0"/>
+          <a:chExt cx="0" cy="0"/>
+        </a:xfrm>
+      </p:grpSpPr>
+      <p:sp>
+        <p:nvSpPr>
+          <p:cNvPr id="3" name="Subtitle 2">
+            <a:extLst>
+              <a:ext uri="{FF2B5EF4-FFF2-40B4-BE49-F238E27FC236}">
+                <a16:creationId xmlns:a16="http://schemas.microsoft.com/office/drawing/2014/main" id="{39E9CC7C-B571-4717-8C40-BBECA664A0B5}"/>
+              </a:ext>
+            </a:extLst>
+          </p:cNvPr>
+          <p:cNvSpPr>
+            <a:spLocks noGrp="1"/>
+          </p:cNvSpPr>
+          <p:nvPr>
+            <p:ph type="subTitle" idx="1"/>
+          </p:nvPr>
+        </p:nvSpPr>
+        <p:spPr>
+          <a:xfrm>
+            <a:off x="520137" y="485735"/>
+            <a:ext cx="8825658" cy="6238338"/>
+          </a:xfrm>
+        </p:spPr>
+        <p:txBody>
+          <a:bodyPr>
+            <a:normAutofit/>
+          </a:bodyPr>
+          <a:lstStyle/>
+          <a:p>
+            <a:r>
+              <a:rPr lang="en-US" sz="4000" b="1" dirty="0"/>
+              <a:t>LET’s deep to </a:t>
+            </a:r>
+            <a:r>
+              <a:rPr lang="en-US" sz="4000" b="1" dirty="0" err="1"/>
+              <a:t>zabbix</a:t>
+            </a:r>
+            <a:endParaRPr lang="en-US" sz="4000" b="1" dirty="0"/>
+          </a:p>
+        </p:txBody>
+      </p:sp>
+    </p:spTree>
+    <p:extLst>
+      <p:ext uri="{BB962C8B-B14F-4D97-AF65-F5344CB8AC3E}">
+        <p14:creationId xmlns:p14="http://schemas.microsoft.com/office/powerpoint/2010/main" val="1735809644"/>
+      </p:ext>
+    </p:extLst>
+  </p:cSld>
+  <p:clrMapOvr>
+    <a:masterClrMapping/>
+  </p:clrMapOvr>
+</p:sld>
+</file>
+
+<file path=ppt/slides/slide13.xml><?xml version="1.0" encoding="utf-8"?>
+<p:sld xmlns:a="http://schemas.openxmlformats.org/drawingml/2006/main" xmlns:r="http://schemas.openxmlformats.org/officeDocument/2006/relationships" xmlns:p="http://schemas.openxmlformats.org/presentationml/2006/main">
+  <p:cSld>
+    <p:spTree>
+      <p:nvGrpSpPr>
+        <p:cNvPr id="1" name=""/>
+        <p:cNvGrpSpPr/>
+        <p:nvPr/>
+      </p:nvGrpSpPr>
+      <p:grpSpPr>
+        <a:xfrm>
+          <a:off x="0" y="0"/>
+          <a:ext cx="0" cy="0"/>
+          <a:chOff x="0" y="0"/>
+          <a:chExt cx="0" cy="0"/>
+        </a:xfrm>
+      </p:grpSpPr>
+      <p:pic>
+        <p:nvPicPr>
+          <p:cNvPr id="7" name="Picture 6">
+            <a:extLst>
+              <a:ext uri="{FF2B5EF4-FFF2-40B4-BE49-F238E27FC236}">
+                <a16:creationId xmlns:a16="http://schemas.microsoft.com/office/drawing/2014/main" id="{76104294-43BD-4134-8A5C-8C4DABF91C4C}"/>
+              </a:ext>
+            </a:extLst>
+          </p:cNvPr>
+          <p:cNvPicPr>
+            <a:picLocks noChangeAspect="1"/>
+          </p:cNvPicPr>
+          <p:nvPr/>
+        </p:nvPicPr>
+        <p:blipFill>
+          <a:blip r:embed="rId2">
+            <a:extLst>
+              <a:ext uri="{28A0092B-C50C-407E-A947-70E740481C1C}">
+                <a14:useLocalDpi xmlns:a14="http://schemas.microsoft.com/office/drawing/2010/main" val="0"/>
+              </a:ext>
+            </a:extLst>
+          </a:blip>
+          <a:stretch>
+            <a:fillRect/>
+          </a:stretch>
+        </p:blipFill>
+        <p:spPr>
+          <a:xfrm>
+            <a:off x="0" y="-1727200"/>
+            <a:ext cx="12192000" cy="9056914"/>
+          </a:xfrm>
+          <a:prstGeom prst="rect">
+            <a:avLst/>
+          </a:prstGeom>
+        </p:spPr>
+      </p:pic>
+    </p:spTree>
+    <p:extLst>
+      <p:ext uri="{BB962C8B-B14F-4D97-AF65-F5344CB8AC3E}">
+        <p14:creationId xmlns:p14="http://schemas.microsoft.com/office/powerpoint/2010/main" val="2913149947"/>
+      </p:ext>
+    </p:extLst>
+  </p:cSld>
+  <p:clrMapOvr>
+    <a:masterClrMapping/>
+  </p:clrMapOvr>
+</p:sld>
+</file>
+
+<file path=ppt/slides/slide14.xml><?xml version="1.0" encoding="utf-8"?>
+<p:sld xmlns:a="http://schemas.openxmlformats.org/drawingml/2006/main" xmlns:r="http://schemas.openxmlformats.org/officeDocument/2006/relationships" xmlns:p="http://schemas.openxmlformats.org/presentationml/2006/main">
+  <p:cSld>
+    <p:spTree>
+      <p:nvGrpSpPr>
+        <p:cNvPr id="1" name=""/>
+        <p:cNvGrpSpPr/>
+        <p:nvPr/>
+      </p:nvGrpSpPr>
+      <p:grpSpPr>
+        <a:xfrm>
+          <a:off x="0" y="0"/>
+          <a:ext cx="0" cy="0"/>
+          <a:chOff x="0" y="0"/>
+          <a:chExt cx="0" cy="0"/>
+        </a:xfrm>
+      </p:grpSpPr>
+      <p:sp>
+        <p:nvSpPr>
+          <p:cNvPr id="3" name="Subtitle 2">
+            <a:extLst>
+              <a:ext uri="{FF2B5EF4-FFF2-40B4-BE49-F238E27FC236}">
+                <a16:creationId xmlns:a16="http://schemas.microsoft.com/office/drawing/2014/main" id="{39E9CC7C-B571-4717-8C40-BBECA664A0B5}"/>
+              </a:ext>
+            </a:extLst>
+          </p:cNvPr>
+          <p:cNvSpPr>
+            <a:spLocks noGrp="1"/>
+          </p:cNvSpPr>
+          <p:nvPr>
+            <p:ph type="subTitle" idx="1"/>
+          </p:nvPr>
+        </p:nvSpPr>
+        <p:spPr>
+          <a:xfrm>
+            <a:off x="520137" y="485735"/>
+            <a:ext cx="8825658" cy="6238338"/>
+          </a:xfrm>
+        </p:spPr>
+        <p:txBody>
+          <a:bodyPr>
+            <a:normAutofit/>
+          </a:bodyPr>
+          <a:lstStyle/>
+          <a:p>
+            <a:r>
+              <a:rPr lang="en-US" sz="4000" b="1" dirty="0"/>
+              <a:t>OVERVIEW</a:t>
+            </a:r>
+          </a:p>
+        </p:txBody>
+      </p:sp>
+    </p:spTree>
+    <p:extLst>
+      <p:ext uri="{BB962C8B-B14F-4D97-AF65-F5344CB8AC3E}">
+        <p14:creationId xmlns:p14="http://schemas.microsoft.com/office/powerpoint/2010/main" val="487498749"/>
+      </p:ext>
+    </p:extLst>
+  </p:cSld>
+  <p:clrMapOvr>
+    <a:masterClrMapping/>
+  </p:clrMapOvr>
+</p:sld>
+</file>
+
+<file path=ppt/slides/slide15.xml><?xml version="1.0" encoding="utf-8"?>
+<p:sld xmlns:a="http://schemas.openxmlformats.org/drawingml/2006/main" xmlns:r="http://schemas.openxmlformats.org/officeDocument/2006/relationships" xmlns:p="http://schemas.openxmlformats.org/presentationml/2006/main">
+  <p:cSld>
+    <p:spTree>
+      <p:nvGrpSpPr>
+        <p:cNvPr id="1" name=""/>
+        <p:cNvGrpSpPr/>
+        <p:nvPr/>
+      </p:nvGrpSpPr>
+      <p:grpSpPr>
+        <a:xfrm>
+          <a:off x="0" y="0"/>
+          <a:ext cx="0" cy="0"/>
+          <a:chOff x="0" y="0"/>
+          <a:chExt cx="0" cy="0"/>
+        </a:xfrm>
+      </p:grpSpPr>
+      <p:sp>
+        <p:nvSpPr>
+          <p:cNvPr id="3" name="Subtitle 2">
+            <a:extLst>
+              <a:ext uri="{FF2B5EF4-FFF2-40B4-BE49-F238E27FC236}">
+                <a16:creationId xmlns:a16="http://schemas.microsoft.com/office/drawing/2014/main" id="{39E9CC7C-B571-4717-8C40-BBECA664A0B5}"/>
+              </a:ext>
+            </a:extLst>
+          </p:cNvPr>
+          <p:cNvSpPr>
+            <a:spLocks noGrp="1"/>
+          </p:cNvSpPr>
+          <p:nvPr>
+            <p:ph type="subTitle" idx="1"/>
+          </p:nvPr>
+        </p:nvSpPr>
+        <p:spPr>
+          <a:xfrm>
+            <a:off x="520137" y="485735"/>
+            <a:ext cx="8825658" cy="6238338"/>
+          </a:xfrm>
+        </p:spPr>
+        <p:txBody>
+          <a:bodyPr>
+            <a:normAutofit/>
+          </a:bodyPr>
+          <a:lstStyle/>
+          <a:p>
+            <a:r>
+              <a:rPr lang="en-US" sz="4000" b="1" dirty="0"/>
+              <a:t>Architecture</a:t>
+            </a:r>
+          </a:p>
+        </p:txBody>
+      </p:sp>
+    </p:spTree>
+    <p:extLst>
+      <p:ext uri="{BB962C8B-B14F-4D97-AF65-F5344CB8AC3E}">
+        <p14:creationId xmlns:p14="http://schemas.microsoft.com/office/powerpoint/2010/main" val="238066310"/>
+      </p:ext>
+    </p:extLst>
+  </p:cSld>
+  <p:clrMapOvr>
+    <a:masterClrMapping/>
+  </p:clrMapOvr>
+</p:sld>
+</file>
+
+<file path=ppt/slides/slide16.xml><?xml version="1.0" encoding="utf-8"?>
+<p:sld xmlns:a="http://schemas.openxmlformats.org/drawingml/2006/main" xmlns:r="http://schemas.openxmlformats.org/officeDocument/2006/relationships" xmlns:p="http://schemas.openxmlformats.org/presentationml/2006/main">
+  <p:cSld>
+    <p:spTree>
+      <p:nvGrpSpPr>
+        <p:cNvPr id="1" name=""/>
+        <p:cNvGrpSpPr/>
+        <p:nvPr/>
+      </p:nvGrpSpPr>
+      <p:grpSpPr>
+        <a:xfrm>
+          <a:off x="0" y="0"/>
+          <a:ext cx="0" cy="0"/>
+          <a:chOff x="0" y="0"/>
+          <a:chExt cx="0" cy="0"/>
+        </a:xfrm>
+      </p:grpSpPr>
+      <p:sp>
+        <p:nvSpPr>
+          <p:cNvPr id="3" name="Subtitle 2">
+            <a:extLst>
+              <a:ext uri="{FF2B5EF4-FFF2-40B4-BE49-F238E27FC236}">
+                <a16:creationId xmlns:a16="http://schemas.microsoft.com/office/drawing/2014/main" id="{39E9CC7C-B571-4717-8C40-BBECA664A0B5}"/>
+              </a:ext>
+            </a:extLst>
+          </p:cNvPr>
+          <p:cNvSpPr>
+            <a:spLocks noGrp="1"/>
+          </p:cNvSpPr>
+          <p:nvPr>
+            <p:ph type="subTitle" idx="1"/>
+          </p:nvPr>
+        </p:nvSpPr>
+        <p:spPr>
+          <a:xfrm>
+            <a:off x="520137" y="485735"/>
+            <a:ext cx="8825658" cy="6238338"/>
+          </a:xfrm>
+        </p:spPr>
+        <p:txBody>
+          <a:bodyPr>
+            <a:normAutofit/>
+          </a:bodyPr>
+          <a:lstStyle/>
+          <a:p>
+            <a:r>
+              <a:rPr lang="en-US" sz="4000" b="1" dirty="0"/>
+              <a:t>functions</a:t>
+            </a:r>
+          </a:p>
+        </p:txBody>
+      </p:sp>
+    </p:spTree>
+    <p:extLst>
+      <p:ext uri="{BB962C8B-B14F-4D97-AF65-F5344CB8AC3E}">
+        <p14:creationId xmlns:p14="http://schemas.microsoft.com/office/powerpoint/2010/main" val="3881764640"/>
+      </p:ext>
+    </p:extLst>
+  </p:cSld>
+  <p:clrMapOvr>
+    <a:masterClrMapping/>
+  </p:clrMapOvr>
+</p:sld>
+</file>
+
+<file path=ppt/slides/slide17.xml><?xml version="1.0" encoding="utf-8"?>
+<p:sld xmlns:a="http://schemas.openxmlformats.org/drawingml/2006/main" xmlns:r="http://schemas.openxmlformats.org/officeDocument/2006/relationships" xmlns:p="http://schemas.openxmlformats.org/presentationml/2006/main">
+  <p:cSld>
+    <p:spTree>
+      <p:nvGrpSpPr>
+        <p:cNvPr id="1" name=""/>
+        <p:cNvGrpSpPr/>
+        <p:nvPr/>
+      </p:nvGrpSpPr>
+      <p:grpSpPr>
+        <a:xfrm>
+          <a:off x="0" y="0"/>
+          <a:ext cx="0" cy="0"/>
+          <a:chOff x="0" y="0"/>
+          <a:chExt cx="0" cy="0"/>
+        </a:xfrm>
+      </p:grpSpPr>
+      <p:sp>
+        <p:nvSpPr>
+          <p:cNvPr id="3" name="Subtitle 2">
+            <a:extLst>
+              <a:ext uri="{FF2B5EF4-FFF2-40B4-BE49-F238E27FC236}">
+                <a16:creationId xmlns:a16="http://schemas.microsoft.com/office/drawing/2014/main" id="{39E9CC7C-B571-4717-8C40-BBECA664A0B5}"/>
+              </a:ext>
+            </a:extLst>
+          </p:cNvPr>
+          <p:cNvSpPr>
+            <a:spLocks noGrp="1"/>
+          </p:cNvSpPr>
+          <p:nvPr>
+            <p:ph type="subTitle" idx="1"/>
+          </p:nvPr>
+        </p:nvSpPr>
+        <p:spPr>
+          <a:xfrm>
+            <a:off x="520137" y="485735"/>
+            <a:ext cx="8825658" cy="6238338"/>
+          </a:xfrm>
+        </p:spPr>
+        <p:txBody>
+          <a:bodyPr>
+            <a:normAutofit/>
+          </a:bodyPr>
+          <a:lstStyle/>
+          <a:p>
+            <a:r>
+              <a:rPr lang="en-US" sz="4000" b="1" dirty="0"/>
+              <a:t>processes</a:t>
+            </a:r>
+          </a:p>
+        </p:txBody>
+      </p:sp>
+    </p:spTree>
+    <p:extLst>
+      <p:ext uri="{BB962C8B-B14F-4D97-AF65-F5344CB8AC3E}">
+        <p14:creationId xmlns:p14="http://schemas.microsoft.com/office/powerpoint/2010/main" val="2590345620"/>
+      </p:ext>
+    </p:extLst>
+  </p:cSld>
+  <p:clrMapOvr>
+    <a:masterClrMapping/>
+  </p:clrMapOvr>
+</p:sld>
+</file>
+
+<file path=ppt/slides/slide18.xml><?xml version="1.0" encoding="utf-8"?>
+<p:sld xmlns:a="http://schemas.openxmlformats.org/drawingml/2006/main" xmlns:r="http://schemas.openxmlformats.org/officeDocument/2006/relationships" xmlns:p="http://schemas.openxmlformats.org/presentationml/2006/main">
+  <p:cSld>
+    <p:spTree>
+      <p:nvGrpSpPr>
+        <p:cNvPr id="1" name=""/>
+        <p:cNvGrpSpPr/>
+        <p:nvPr/>
+      </p:nvGrpSpPr>
+      <p:grpSpPr>
+        <a:xfrm>
+          <a:off x="0" y="0"/>
+          <a:ext cx="0" cy="0"/>
+          <a:chOff x="0" y="0"/>
+          <a:chExt cx="0" cy="0"/>
+        </a:xfrm>
+      </p:grpSpPr>
+      <p:sp>
+        <p:nvSpPr>
+          <p:cNvPr id="3" name="Subtitle 2">
+            <a:extLst>
+              <a:ext uri="{FF2B5EF4-FFF2-40B4-BE49-F238E27FC236}">
+                <a16:creationId xmlns:a16="http://schemas.microsoft.com/office/drawing/2014/main" id="{39E9CC7C-B571-4717-8C40-BBECA664A0B5}"/>
+              </a:ext>
+            </a:extLst>
+          </p:cNvPr>
+          <p:cNvSpPr>
+            <a:spLocks noGrp="1"/>
+          </p:cNvSpPr>
+          <p:nvPr>
+            <p:ph type="subTitle" idx="1"/>
+          </p:nvPr>
+        </p:nvSpPr>
+        <p:spPr>
+          <a:xfrm>
+            <a:off x="520137" y="485735"/>
+            <a:ext cx="8825658" cy="6238338"/>
+          </a:xfrm>
+        </p:spPr>
+        <p:txBody>
+          <a:bodyPr>
+            <a:normAutofit/>
+          </a:bodyPr>
+          <a:lstStyle/>
+          <a:p>
+            <a:r>
+              <a:rPr lang="ru-RU" sz="4000" b="1" dirty="0"/>
+              <a:t>Узлы сети</a:t>
+            </a:r>
+            <a:endParaRPr lang="en-US" sz="4000" b="1" dirty="0"/>
+          </a:p>
+        </p:txBody>
+      </p:sp>
+    </p:spTree>
+    <p:extLst>
+      <p:ext uri="{BB962C8B-B14F-4D97-AF65-F5344CB8AC3E}">
+        <p14:creationId xmlns:p14="http://schemas.microsoft.com/office/powerpoint/2010/main" val="3154492423"/>
+      </p:ext>
+    </p:extLst>
+  </p:cSld>
+  <p:clrMapOvr>
+    <a:masterClrMapping/>
+  </p:clrMapOvr>
+</p:sld>
+</file>
+
+<file path=ppt/slides/slide19.xml><?xml version="1.0" encoding="utf-8"?>
+<p:sld xmlns:a="http://schemas.openxmlformats.org/drawingml/2006/main" xmlns:r="http://schemas.openxmlformats.org/officeDocument/2006/relationships" xmlns:p="http://schemas.openxmlformats.org/presentationml/2006/main">
+  <p:cSld>
+    <p:spTree>
+      <p:nvGrpSpPr>
+        <p:cNvPr id="1" name=""/>
+        <p:cNvGrpSpPr/>
+        <p:nvPr/>
+      </p:nvGrpSpPr>
+      <p:grpSpPr>
+        <a:xfrm>
+          <a:off x="0" y="0"/>
+          <a:ext cx="0" cy="0"/>
+          <a:chOff x="0" y="0"/>
+          <a:chExt cx="0" cy="0"/>
+        </a:xfrm>
+      </p:grpSpPr>
+      <p:sp>
+        <p:nvSpPr>
+          <p:cNvPr id="3" name="Subtitle 2">
+            <a:extLst>
+              <a:ext uri="{FF2B5EF4-FFF2-40B4-BE49-F238E27FC236}">
+                <a16:creationId xmlns:a16="http://schemas.microsoft.com/office/drawing/2014/main" id="{39E9CC7C-B571-4717-8C40-BBECA664A0B5}"/>
+              </a:ext>
+            </a:extLst>
+          </p:cNvPr>
+          <p:cNvSpPr>
+            <a:spLocks noGrp="1"/>
+          </p:cNvSpPr>
+          <p:nvPr>
+            <p:ph type="subTitle" idx="1"/>
+          </p:nvPr>
+        </p:nvSpPr>
+        <p:spPr>
+          <a:xfrm>
+            <a:off x="520137" y="485735"/>
+            <a:ext cx="8825658" cy="6238338"/>
+          </a:xfrm>
+        </p:spPr>
+        <p:txBody>
+          <a:bodyPr>
+            <a:normAutofit/>
+          </a:bodyPr>
+          <a:lstStyle/>
+          <a:p>
+            <a:r>
+              <a:rPr lang="ru-RU" sz="4000" b="1" dirty="0"/>
+              <a:t>Элементы данных</a:t>
+            </a:r>
+            <a:endParaRPr lang="en-US" sz="4000" b="1" dirty="0"/>
+          </a:p>
+        </p:txBody>
+      </p:sp>
+    </p:spTree>
+    <p:extLst>
+      <p:ext uri="{BB962C8B-B14F-4D97-AF65-F5344CB8AC3E}">
+        <p14:creationId xmlns:p14="http://schemas.microsoft.com/office/powerpoint/2010/main" val="977403197"/>
+      </p:ext>
+    </p:extLst>
+  </p:cSld>
+  <p:clrMapOvr>
+    <a:masterClrMapping/>
+  </p:clrMapOvr>
+</p:sld>
+</file>
+
+<file path=ppt/slides/slide2.xml><?xml version="1.0" encoding="utf-8"?>
+<p:sld xmlns:a="http://schemas.openxmlformats.org/drawingml/2006/main" xmlns:r="http://schemas.openxmlformats.org/officeDocument/2006/relationships" xmlns:p="http://schemas.openxmlformats.org/presentationml/2006/main">
+  <p:cSld>
+    <p:spTree>
+      <p:nvGrpSpPr>
+        <p:cNvPr id="1" name=""/>
+        <p:cNvGrpSpPr/>
+        <p:nvPr/>
+      </p:nvGrpSpPr>
+      <p:grpSpPr>
+        <a:xfrm>
+          <a:off x="0" y="0"/>
+          <a:ext cx="0" cy="0"/>
+          <a:chOff x="0" y="0"/>
+          <a:chExt cx="0" cy="0"/>
+        </a:xfrm>
+      </p:grpSpPr>
+      <p:sp>
+        <p:nvSpPr>
           <p:cNvPr id="3" name="Subtitle 2">
             <a:extLst>
               <a:ext uri="{FF2B5EF4-FFF2-40B4-BE49-F238E27FC236}">
@@ -6093,7 +6960,7 @@
 </p:sld>
 </file>
 
-<file path=ppt/slides/slide2.xml><?xml version="1.0" encoding="utf-8"?>
+<file path=ppt/slides/slide20.xml><?xml version="1.0" encoding="utf-8"?>
 <p:sld xmlns:a="http://schemas.openxmlformats.org/drawingml/2006/main" xmlns:r="http://schemas.openxmlformats.org/officeDocument/2006/relationships" xmlns:p="http://schemas.openxmlformats.org/presentationml/2006/main">
   <p:cSld>
     <p:spTree>
@@ -6112,39 +6979,6 @@
       </p:grpSpPr>
       <p:sp>
         <p:nvSpPr>
-          <p:cNvPr id="2" name="Title 1">
-            <a:extLst>
-              <a:ext uri="{FF2B5EF4-FFF2-40B4-BE49-F238E27FC236}">
-                <a16:creationId xmlns:a16="http://schemas.microsoft.com/office/drawing/2014/main" id="{9C40072D-784F-4A53-95BC-13C11F7F82F8}"/>
-              </a:ext>
-            </a:extLst>
-          </p:cNvPr>
-          <p:cNvSpPr>
-            <a:spLocks noGrp="1"/>
-          </p:cNvSpPr>
-          <p:nvPr>
-            <p:ph type="ctrTitle"/>
-          </p:nvPr>
-        </p:nvSpPr>
-        <p:spPr>
-          <a:xfrm>
-            <a:off x="712556" y="410527"/>
-            <a:ext cx="4207158" cy="1011315"/>
-          </a:xfrm>
-        </p:spPr>
-        <p:txBody>
-          <a:bodyPr/>
-          <a:lstStyle/>
-          <a:p>
-            <a:r>
-              <a:rPr lang="en-US" dirty="0"/>
-              <a:t>ZABBIX</a:t>
-            </a:r>
-          </a:p>
-        </p:txBody>
-      </p:sp>
-      <p:sp>
-        <p:nvSpPr>
           <p:cNvPr id="3" name="Subtitle 2">
             <a:extLst>
               <a:ext uri="{FF2B5EF4-FFF2-40B4-BE49-F238E27FC236}">
@@ -6161,27 +6995,483 @@
         </p:nvSpPr>
         <p:spPr>
           <a:xfrm>
-            <a:off x="506885" y="4713179"/>
-            <a:ext cx="8825658" cy="494926"/>
+            <a:off x="520137" y="485735"/>
+            <a:ext cx="8825658" cy="6238338"/>
           </a:xfrm>
         </p:spPr>
         <p:txBody>
           <a:bodyPr>
-            <a:normAutofit lnSpcReduction="10000"/>
+            <a:normAutofit/>
           </a:bodyPr>
           <a:lstStyle/>
           <a:p>
             <a:r>
-              <a:rPr lang="en-US" sz="2800" b="1" dirty="0"/>
-              <a:t>Let’s talk about metrics</a:t>
-            </a:r>
+              <a:rPr lang="ru-RU" sz="4000" b="1" dirty="0"/>
+              <a:t>Уведомления</a:t>
+            </a:r>
+            <a:endParaRPr lang="en-US" sz="4000" b="1" dirty="0"/>
           </a:p>
         </p:txBody>
       </p:sp>
     </p:spTree>
     <p:extLst>
       <p:ext uri="{BB962C8B-B14F-4D97-AF65-F5344CB8AC3E}">
-        <p14:creationId xmlns:p14="http://schemas.microsoft.com/office/powerpoint/2010/main" val="2008311757"/>
+        <p14:creationId xmlns:p14="http://schemas.microsoft.com/office/powerpoint/2010/main" val="59098598"/>
+      </p:ext>
+    </p:extLst>
+  </p:cSld>
+  <p:clrMapOvr>
+    <a:masterClrMapping/>
+  </p:clrMapOvr>
+</p:sld>
+</file>
+
+<file path=ppt/slides/slide21.xml><?xml version="1.0" encoding="utf-8"?>
+<p:sld xmlns:a="http://schemas.openxmlformats.org/drawingml/2006/main" xmlns:r="http://schemas.openxmlformats.org/officeDocument/2006/relationships" xmlns:p="http://schemas.openxmlformats.org/presentationml/2006/main">
+  <p:cSld>
+    <p:spTree>
+      <p:nvGrpSpPr>
+        <p:cNvPr id="1" name=""/>
+        <p:cNvGrpSpPr/>
+        <p:nvPr/>
+      </p:nvGrpSpPr>
+      <p:grpSpPr>
+        <a:xfrm>
+          <a:off x="0" y="0"/>
+          <a:ext cx="0" cy="0"/>
+          <a:chOff x="0" y="0"/>
+          <a:chExt cx="0" cy="0"/>
+        </a:xfrm>
+      </p:grpSpPr>
+      <p:sp>
+        <p:nvSpPr>
+          <p:cNvPr id="3" name="Subtitle 2">
+            <a:extLst>
+              <a:ext uri="{FF2B5EF4-FFF2-40B4-BE49-F238E27FC236}">
+                <a16:creationId xmlns:a16="http://schemas.microsoft.com/office/drawing/2014/main" id="{39E9CC7C-B571-4717-8C40-BBECA664A0B5}"/>
+              </a:ext>
+            </a:extLst>
+          </p:cNvPr>
+          <p:cNvSpPr>
+            <a:spLocks noGrp="1"/>
+          </p:cNvSpPr>
+          <p:nvPr>
+            <p:ph type="subTitle" idx="1"/>
+          </p:nvPr>
+        </p:nvSpPr>
+        <p:spPr>
+          <a:xfrm>
+            <a:off x="520137" y="485735"/>
+            <a:ext cx="8825658" cy="6238338"/>
+          </a:xfrm>
+        </p:spPr>
+        <p:txBody>
+          <a:bodyPr>
+            <a:normAutofit/>
+          </a:bodyPr>
+          <a:lstStyle/>
+          <a:p>
+            <a:r>
+              <a:rPr lang="ru-RU" sz="4000" b="1" dirty="0"/>
+              <a:t>Шаблоны</a:t>
+            </a:r>
+          </a:p>
+        </p:txBody>
+      </p:sp>
+    </p:spTree>
+    <p:extLst>
+      <p:ext uri="{BB962C8B-B14F-4D97-AF65-F5344CB8AC3E}">
+        <p14:creationId xmlns:p14="http://schemas.microsoft.com/office/powerpoint/2010/main" val="4117432524"/>
+      </p:ext>
+    </p:extLst>
+  </p:cSld>
+  <p:clrMapOvr>
+    <a:masterClrMapping/>
+  </p:clrMapOvr>
+</p:sld>
+</file>
+
+<file path=ppt/slides/slide22.xml><?xml version="1.0" encoding="utf-8"?>
+<p:sld xmlns:a="http://schemas.openxmlformats.org/drawingml/2006/main" xmlns:r="http://schemas.openxmlformats.org/officeDocument/2006/relationships" xmlns:p="http://schemas.openxmlformats.org/presentationml/2006/main">
+  <p:cSld>
+    <p:spTree>
+      <p:nvGrpSpPr>
+        <p:cNvPr id="1" name=""/>
+        <p:cNvGrpSpPr/>
+        <p:nvPr/>
+      </p:nvGrpSpPr>
+      <p:grpSpPr>
+        <a:xfrm>
+          <a:off x="0" y="0"/>
+          <a:ext cx="0" cy="0"/>
+          <a:chOff x="0" y="0"/>
+          <a:chExt cx="0" cy="0"/>
+        </a:xfrm>
+      </p:grpSpPr>
+      <p:sp>
+        <p:nvSpPr>
+          <p:cNvPr id="3" name="Subtitle 2">
+            <a:extLst>
+              <a:ext uri="{FF2B5EF4-FFF2-40B4-BE49-F238E27FC236}">
+                <a16:creationId xmlns:a16="http://schemas.microsoft.com/office/drawing/2014/main" id="{39E9CC7C-B571-4717-8C40-BBECA664A0B5}"/>
+              </a:ext>
+            </a:extLst>
+          </p:cNvPr>
+          <p:cNvSpPr>
+            <a:spLocks noGrp="1"/>
+          </p:cNvSpPr>
+          <p:nvPr>
+            <p:ph type="subTitle" idx="1"/>
+          </p:nvPr>
+        </p:nvSpPr>
+        <p:spPr>
+          <a:xfrm>
+            <a:off x="520137" y="485735"/>
+            <a:ext cx="8825658" cy="6238338"/>
+          </a:xfrm>
+        </p:spPr>
+        <p:txBody>
+          <a:bodyPr>
+            <a:normAutofit/>
+          </a:bodyPr>
+          <a:lstStyle/>
+          <a:p>
+            <a:r>
+              <a:rPr lang="ru-RU" sz="4000" b="1" dirty="0"/>
+              <a:t>Триггеры</a:t>
+            </a:r>
+          </a:p>
+        </p:txBody>
+      </p:sp>
+    </p:spTree>
+    <p:extLst>
+      <p:ext uri="{BB962C8B-B14F-4D97-AF65-F5344CB8AC3E}">
+        <p14:creationId xmlns:p14="http://schemas.microsoft.com/office/powerpoint/2010/main" val="997997870"/>
+      </p:ext>
+    </p:extLst>
+  </p:cSld>
+  <p:clrMapOvr>
+    <a:masterClrMapping/>
+  </p:clrMapOvr>
+</p:sld>
+</file>
+
+<file path=ppt/slides/slide23.xml><?xml version="1.0" encoding="utf-8"?>
+<p:sld xmlns:a="http://schemas.openxmlformats.org/drawingml/2006/main" xmlns:r="http://schemas.openxmlformats.org/officeDocument/2006/relationships" xmlns:p="http://schemas.openxmlformats.org/presentationml/2006/main">
+  <p:cSld>
+    <p:spTree>
+      <p:nvGrpSpPr>
+        <p:cNvPr id="1" name=""/>
+        <p:cNvGrpSpPr/>
+        <p:nvPr/>
+      </p:nvGrpSpPr>
+      <p:grpSpPr>
+        <a:xfrm>
+          <a:off x="0" y="0"/>
+          <a:ext cx="0" cy="0"/>
+          <a:chOff x="0" y="0"/>
+          <a:chExt cx="0" cy="0"/>
+        </a:xfrm>
+      </p:grpSpPr>
+      <p:sp>
+        <p:nvSpPr>
+          <p:cNvPr id="3" name="Subtitle 2">
+            <a:extLst>
+              <a:ext uri="{FF2B5EF4-FFF2-40B4-BE49-F238E27FC236}">
+                <a16:creationId xmlns:a16="http://schemas.microsoft.com/office/drawing/2014/main" id="{39E9CC7C-B571-4717-8C40-BBECA664A0B5}"/>
+              </a:ext>
+            </a:extLst>
+          </p:cNvPr>
+          <p:cNvSpPr>
+            <a:spLocks noGrp="1"/>
+          </p:cNvSpPr>
+          <p:nvPr>
+            <p:ph type="subTitle" idx="1"/>
+          </p:nvPr>
+        </p:nvSpPr>
+        <p:spPr>
+          <a:xfrm>
+            <a:off x="520137" y="485735"/>
+            <a:ext cx="8825658" cy="6238338"/>
+          </a:xfrm>
+        </p:spPr>
+        <p:txBody>
+          <a:bodyPr>
+            <a:normAutofit/>
+          </a:bodyPr>
+          <a:lstStyle/>
+          <a:p>
+            <a:r>
+              <a:rPr lang="ru-RU" sz="4000" b="1" dirty="0"/>
+              <a:t>События</a:t>
+            </a:r>
+          </a:p>
+        </p:txBody>
+      </p:sp>
+    </p:spTree>
+    <p:extLst>
+      <p:ext uri="{BB962C8B-B14F-4D97-AF65-F5344CB8AC3E}">
+        <p14:creationId xmlns:p14="http://schemas.microsoft.com/office/powerpoint/2010/main" val="2823892772"/>
+      </p:ext>
+    </p:extLst>
+  </p:cSld>
+  <p:clrMapOvr>
+    <a:masterClrMapping/>
+  </p:clrMapOvr>
+</p:sld>
+</file>
+
+<file path=ppt/slides/slide24.xml><?xml version="1.0" encoding="utf-8"?>
+<p:sld xmlns:a="http://schemas.openxmlformats.org/drawingml/2006/main" xmlns:r="http://schemas.openxmlformats.org/officeDocument/2006/relationships" xmlns:p="http://schemas.openxmlformats.org/presentationml/2006/main">
+  <p:cSld>
+    <p:spTree>
+      <p:nvGrpSpPr>
+        <p:cNvPr id="1" name=""/>
+        <p:cNvGrpSpPr/>
+        <p:nvPr/>
+      </p:nvGrpSpPr>
+      <p:grpSpPr>
+        <a:xfrm>
+          <a:off x="0" y="0"/>
+          <a:ext cx="0" cy="0"/>
+          <a:chOff x="0" y="0"/>
+          <a:chExt cx="0" cy="0"/>
+        </a:xfrm>
+      </p:grpSpPr>
+      <p:sp>
+        <p:nvSpPr>
+          <p:cNvPr id="3" name="Subtitle 2">
+            <a:extLst>
+              <a:ext uri="{FF2B5EF4-FFF2-40B4-BE49-F238E27FC236}">
+                <a16:creationId xmlns:a16="http://schemas.microsoft.com/office/drawing/2014/main" id="{39E9CC7C-B571-4717-8C40-BBECA664A0B5}"/>
+              </a:ext>
+            </a:extLst>
+          </p:cNvPr>
+          <p:cNvSpPr>
+            <a:spLocks noGrp="1"/>
+          </p:cNvSpPr>
+          <p:nvPr>
+            <p:ph type="subTitle" idx="1"/>
+          </p:nvPr>
+        </p:nvSpPr>
+        <p:spPr>
+          <a:xfrm>
+            <a:off x="520137" y="485735"/>
+            <a:ext cx="8825658" cy="6238338"/>
+          </a:xfrm>
+        </p:spPr>
+        <p:txBody>
+          <a:bodyPr>
+            <a:normAutofit/>
+          </a:bodyPr>
+          <a:lstStyle/>
+          <a:p>
+            <a:r>
+              <a:rPr lang="ru-RU" sz="4000" b="1" dirty="0"/>
+              <a:t>визуализация</a:t>
+            </a:r>
+          </a:p>
+        </p:txBody>
+      </p:sp>
+    </p:spTree>
+    <p:extLst>
+      <p:ext uri="{BB962C8B-B14F-4D97-AF65-F5344CB8AC3E}">
+        <p14:creationId xmlns:p14="http://schemas.microsoft.com/office/powerpoint/2010/main" val="2669237232"/>
+      </p:ext>
+    </p:extLst>
+  </p:cSld>
+  <p:clrMapOvr>
+    <a:masterClrMapping/>
+  </p:clrMapOvr>
+</p:sld>
+</file>
+
+<file path=ppt/slides/slide25.xml><?xml version="1.0" encoding="utf-8"?>
+<p:sld xmlns:a="http://schemas.openxmlformats.org/drawingml/2006/main" xmlns:r="http://schemas.openxmlformats.org/officeDocument/2006/relationships" xmlns:p="http://schemas.openxmlformats.org/presentationml/2006/main">
+  <p:cSld>
+    <p:spTree>
+      <p:nvGrpSpPr>
+        <p:cNvPr id="1" name=""/>
+        <p:cNvGrpSpPr/>
+        <p:nvPr/>
+      </p:nvGrpSpPr>
+      <p:grpSpPr>
+        <a:xfrm>
+          <a:off x="0" y="0"/>
+          <a:ext cx="0" cy="0"/>
+          <a:chOff x="0" y="0"/>
+          <a:chExt cx="0" cy="0"/>
+        </a:xfrm>
+      </p:grpSpPr>
+      <p:sp>
+        <p:nvSpPr>
+          <p:cNvPr id="3" name="Subtitle 2">
+            <a:extLst>
+              <a:ext uri="{FF2B5EF4-FFF2-40B4-BE49-F238E27FC236}">
+                <a16:creationId xmlns:a16="http://schemas.microsoft.com/office/drawing/2014/main" id="{39E9CC7C-B571-4717-8C40-BBECA664A0B5}"/>
+              </a:ext>
+            </a:extLst>
+          </p:cNvPr>
+          <p:cNvSpPr>
+            <a:spLocks noGrp="1"/>
+          </p:cNvSpPr>
+          <p:nvPr>
+            <p:ph type="subTitle" idx="1"/>
+          </p:nvPr>
+        </p:nvSpPr>
+        <p:spPr>
+          <a:xfrm>
+            <a:off x="520137" y="485735"/>
+            <a:ext cx="8825658" cy="6238338"/>
+          </a:xfrm>
+        </p:spPr>
+        <p:txBody>
+          <a:bodyPr>
+            <a:normAutofit/>
+          </a:bodyPr>
+          <a:lstStyle/>
+          <a:p>
+            <a:r>
+              <a:rPr lang="ru-RU" sz="4000" b="1" dirty="0"/>
+              <a:t>оповещения</a:t>
+            </a:r>
+          </a:p>
+        </p:txBody>
+      </p:sp>
+    </p:spTree>
+    <p:extLst>
+      <p:ext uri="{BB962C8B-B14F-4D97-AF65-F5344CB8AC3E}">
+        <p14:creationId xmlns:p14="http://schemas.microsoft.com/office/powerpoint/2010/main" val="2925787160"/>
+      </p:ext>
+    </p:extLst>
+  </p:cSld>
+  <p:clrMapOvr>
+    <a:masterClrMapping/>
+  </p:clrMapOvr>
+</p:sld>
+</file>
+
+<file path=ppt/slides/slide26.xml><?xml version="1.0" encoding="utf-8"?>
+<p:sld xmlns:a="http://schemas.openxmlformats.org/drawingml/2006/main" xmlns:r="http://schemas.openxmlformats.org/officeDocument/2006/relationships" xmlns:p="http://schemas.openxmlformats.org/presentationml/2006/main">
+  <p:cSld>
+    <p:spTree>
+      <p:nvGrpSpPr>
+        <p:cNvPr id="1" name=""/>
+        <p:cNvGrpSpPr/>
+        <p:nvPr/>
+      </p:nvGrpSpPr>
+      <p:grpSpPr>
+        <a:xfrm>
+          <a:off x="0" y="0"/>
+          <a:ext cx="0" cy="0"/>
+          <a:chOff x="0" y="0"/>
+          <a:chExt cx="0" cy="0"/>
+        </a:xfrm>
+      </p:grpSpPr>
+      <p:sp>
+        <p:nvSpPr>
+          <p:cNvPr id="3" name="Subtitle 2">
+            <a:extLst>
+              <a:ext uri="{FF2B5EF4-FFF2-40B4-BE49-F238E27FC236}">
+                <a16:creationId xmlns:a16="http://schemas.microsoft.com/office/drawing/2014/main" id="{39E9CC7C-B571-4717-8C40-BBECA664A0B5}"/>
+              </a:ext>
+            </a:extLst>
+          </p:cNvPr>
+          <p:cNvSpPr>
+            <a:spLocks noGrp="1"/>
+          </p:cNvSpPr>
+          <p:nvPr>
+            <p:ph type="subTitle" idx="1"/>
+          </p:nvPr>
+        </p:nvSpPr>
+        <p:spPr>
+          <a:xfrm>
+            <a:off x="520137" y="485735"/>
+            <a:ext cx="8825658" cy="6238338"/>
+          </a:xfrm>
+        </p:spPr>
+        <p:txBody>
+          <a:bodyPr>
+            <a:normAutofit/>
+          </a:bodyPr>
+          <a:lstStyle/>
+          <a:p>
+            <a:r>
+              <a:rPr lang="ru-RU" sz="4000" b="1" dirty="0"/>
+              <a:t>Мониторинг услуг и веб мониторин</a:t>
+            </a:r>
+          </a:p>
+        </p:txBody>
+      </p:sp>
+    </p:spTree>
+    <p:extLst>
+      <p:ext uri="{BB962C8B-B14F-4D97-AF65-F5344CB8AC3E}">
+        <p14:creationId xmlns:p14="http://schemas.microsoft.com/office/powerpoint/2010/main" val="2406309429"/>
+      </p:ext>
+    </p:extLst>
+  </p:cSld>
+  <p:clrMapOvr>
+    <a:masterClrMapping/>
+  </p:clrMapOvr>
+</p:sld>
+</file>
+
+<file path=ppt/slides/slide27.xml><?xml version="1.0" encoding="utf-8"?>
+<p:sld xmlns:a="http://schemas.openxmlformats.org/drawingml/2006/main" xmlns:r="http://schemas.openxmlformats.org/officeDocument/2006/relationships" xmlns:p="http://schemas.openxmlformats.org/presentationml/2006/main">
+  <p:cSld>
+    <p:spTree>
+      <p:nvGrpSpPr>
+        <p:cNvPr id="1" name=""/>
+        <p:cNvGrpSpPr/>
+        <p:nvPr/>
+      </p:nvGrpSpPr>
+      <p:grpSpPr>
+        <a:xfrm>
+          <a:off x="0" y="0"/>
+          <a:ext cx="0" cy="0"/>
+          <a:chOff x="0" y="0"/>
+          <a:chExt cx="0" cy="0"/>
+        </a:xfrm>
+      </p:grpSpPr>
+      <p:sp>
+        <p:nvSpPr>
+          <p:cNvPr id="3" name="Subtitle 2">
+            <a:extLst>
+              <a:ext uri="{FF2B5EF4-FFF2-40B4-BE49-F238E27FC236}">
+                <a16:creationId xmlns:a16="http://schemas.microsoft.com/office/drawing/2014/main" id="{39E9CC7C-B571-4717-8C40-BBECA664A0B5}"/>
+              </a:ext>
+            </a:extLst>
+          </p:cNvPr>
+          <p:cNvSpPr>
+            <a:spLocks noGrp="1"/>
+          </p:cNvSpPr>
+          <p:nvPr>
+            <p:ph type="subTitle" idx="1"/>
+          </p:nvPr>
+        </p:nvSpPr>
+        <p:spPr>
+          <a:xfrm>
+            <a:off x="520137" y="485735"/>
+            <a:ext cx="8825658" cy="6238338"/>
+          </a:xfrm>
+        </p:spPr>
+        <p:txBody>
+          <a:bodyPr>
+            <a:normAutofit/>
+          </a:bodyPr>
+          <a:lstStyle/>
+          <a:p>
+            <a:r>
+              <a:rPr lang="ru-RU" sz="4000" b="1" dirty="0"/>
+              <a:t>Проблемы и работа с проблемами</a:t>
+            </a:r>
+          </a:p>
+        </p:txBody>
+      </p:sp>
+    </p:spTree>
+    <p:extLst>
+      <p:ext uri="{BB962C8B-B14F-4D97-AF65-F5344CB8AC3E}">
+        <p14:creationId xmlns:p14="http://schemas.microsoft.com/office/powerpoint/2010/main" val="3921725771"/>
       </p:ext>
     </p:extLst>
   </p:cSld>
@@ -6226,17 +7516,20 @@
         </p:nvSpPr>
         <p:spPr>
           <a:xfrm>
-            <a:off x="520137" y="485735"/>
-            <a:ext cx="8825658" cy="494926"/>
+            <a:off x="520137" y="485734"/>
+            <a:ext cx="8825658" cy="1435429"/>
           </a:xfrm>
         </p:spPr>
         <p:txBody>
           <a:bodyPr>
-            <a:normAutofit lnSpcReduction="10000"/>
+            <a:normAutofit/>
           </a:bodyPr>
           <a:lstStyle/>
           <a:p>
-            <a:endParaRPr lang="en-US" sz="2800" b="1" dirty="0"/>
+            <a:r>
+              <a:rPr lang="en-US" sz="4000" b="1" dirty="0"/>
+              <a:t>is It Tasty?</a:t>
+            </a:r>
           </a:p>
         </p:txBody>
       </p:sp>
@@ -6289,15 +7582,50 @@
         <p:spPr>
           <a:xfrm>
             <a:off x="520137" y="485735"/>
-            <a:ext cx="8825658" cy="494926"/>
+            <a:ext cx="8825658" cy="6136738"/>
           </a:xfrm>
         </p:spPr>
         <p:txBody>
           <a:bodyPr>
-            <a:normAutofit lnSpcReduction="10000"/>
+            <a:normAutofit/>
           </a:bodyPr>
           <a:lstStyle/>
           <a:p>
+            <a:r>
+              <a:rPr lang="en-US" sz="4000" b="1" dirty="0"/>
+              <a:t>is It Tasty?</a:t>
+            </a:r>
+          </a:p>
+          <a:p>
+            <a:endParaRPr lang="en-US" sz="4000" b="1" dirty="0"/>
+          </a:p>
+          <a:p>
+            <a:pPr marL="457200" indent="-457200">
+              <a:buFont typeface="Arial" panose="020B0604020202020204" pitchFamily="34" charset="0"/>
+              <a:buChar char="•"/>
+            </a:pPr>
+            <a:r>
+              <a:rPr lang="ru-RU" sz="2400" b="1" dirty="0"/>
+              <a:t>Что такое </a:t>
+            </a:r>
+            <a:r>
+              <a:rPr lang="en-US" sz="2400" b="1" dirty="0" err="1"/>
+              <a:t>zabbix</a:t>
+            </a:r>
+            <a:r>
+              <a:rPr lang="ru-RU" sz="2400" b="1" dirty="0"/>
+              <a:t>? </a:t>
+            </a:r>
+            <a:endParaRPr lang="en-US" sz="2400" b="1" dirty="0"/>
+          </a:p>
+          <a:p>
+            <a:endParaRPr lang="en-US" sz="2800" b="1" dirty="0"/>
+          </a:p>
+          <a:p>
+            <a:pPr marL="457200" indent="-457200">
+              <a:buFont typeface="Arial" panose="020B0604020202020204" pitchFamily="34" charset="0"/>
+              <a:buChar char="•"/>
+            </a:pPr>
             <a:endParaRPr lang="en-US" sz="2800" b="1" dirty="0"/>
           </a:p>
         </p:txBody>
@@ -6305,7 +7633,7 @@
     </p:spTree>
     <p:extLst>
       <p:ext uri="{BB962C8B-B14F-4D97-AF65-F5344CB8AC3E}">
-        <p14:creationId xmlns:p14="http://schemas.microsoft.com/office/powerpoint/2010/main" val="1580408681"/>
+        <p14:creationId xmlns:p14="http://schemas.microsoft.com/office/powerpoint/2010/main" val="3521407100"/>
       </p:ext>
     </p:extLst>
   </p:cSld>
@@ -6351,15 +7679,75 @@
         <p:spPr>
           <a:xfrm>
             <a:off x="520137" y="485735"/>
-            <a:ext cx="8825658" cy="494926"/>
+            <a:ext cx="8825658" cy="6136738"/>
           </a:xfrm>
         </p:spPr>
         <p:txBody>
           <a:bodyPr>
-            <a:normAutofit lnSpcReduction="10000"/>
+            <a:normAutofit/>
           </a:bodyPr>
           <a:lstStyle/>
           <a:p>
+            <a:r>
+              <a:rPr lang="en-US" sz="4000" b="1" dirty="0"/>
+              <a:t>is It Tasty?</a:t>
+            </a:r>
+          </a:p>
+          <a:p>
+            <a:endParaRPr lang="en-US" sz="4000" b="1" dirty="0"/>
+          </a:p>
+          <a:p>
+            <a:pPr marL="457200" indent="-457200">
+              <a:buFont typeface="Arial" panose="020B0604020202020204" pitchFamily="34" charset="0"/>
+              <a:buChar char="•"/>
+            </a:pPr>
+            <a:r>
+              <a:rPr lang="ru-RU" sz="2400" b="1" dirty="0"/>
+              <a:t>Что такое </a:t>
+            </a:r>
+            <a:r>
+              <a:rPr lang="en-US" sz="2400" b="1" dirty="0" err="1"/>
+              <a:t>zabbix</a:t>
+            </a:r>
+            <a:r>
+              <a:rPr lang="ru-RU" sz="2400" b="1" dirty="0"/>
+              <a:t>?</a:t>
+            </a:r>
+            <a:endParaRPr lang="en-US" sz="2400" b="1" dirty="0"/>
+          </a:p>
+          <a:p>
+            <a:pPr marL="457200" indent="-457200">
+              <a:buFont typeface="Arial" panose="020B0604020202020204" pitchFamily="34" charset="0"/>
+              <a:buChar char="•"/>
+            </a:pPr>
+            <a:r>
+              <a:rPr lang="ru-RU" sz="2400" b="1" dirty="0"/>
+              <a:t>Где мы можем использовать </a:t>
+            </a:r>
+            <a:r>
+              <a:rPr lang="en-US" sz="2400" b="1" dirty="0" err="1"/>
+              <a:t>zabbix</a:t>
+            </a:r>
+            <a:r>
+              <a:rPr lang="en-US" sz="2400" b="1" dirty="0"/>
+              <a:t>?</a:t>
+            </a:r>
+          </a:p>
+          <a:p>
+            <a:r>
+              <a:rPr lang="ru-RU" sz="2800" b="1" dirty="0"/>
+              <a:t> </a:t>
+            </a:r>
+            <a:endParaRPr lang="en-US" sz="2800" b="1" dirty="0"/>
+          </a:p>
+          <a:p>
+            <a:endParaRPr lang="en-US" sz="2800" b="1" dirty="0"/>
+          </a:p>
+          <a:p>
+            <a:pPr marL="457200" indent="-457200">
+              <a:buFont typeface="Arial" panose="020B0604020202020204" pitchFamily="34" charset="0"/>
+              <a:buChar char="•"/>
+            </a:pPr>
             <a:endParaRPr lang="en-US" sz="2800" b="1" dirty="0"/>
           </a:p>
         </p:txBody>
@@ -6367,7 +7755,7 @@
     </p:spTree>
     <p:extLst>
       <p:ext uri="{BB962C8B-B14F-4D97-AF65-F5344CB8AC3E}">
-        <p14:creationId xmlns:p14="http://schemas.microsoft.com/office/powerpoint/2010/main" val="148099828"/>
+        <p14:creationId xmlns:p14="http://schemas.microsoft.com/office/powerpoint/2010/main" val="1585297855"/>
       </p:ext>
     </p:extLst>
   </p:cSld>
@@ -6413,6 +7801,147 @@
         <p:spPr>
           <a:xfrm>
             <a:off x="520137" y="485735"/>
+            <a:ext cx="8825658" cy="6136738"/>
+          </a:xfrm>
+        </p:spPr>
+        <p:txBody>
+          <a:bodyPr>
+            <a:normAutofit/>
+          </a:bodyPr>
+          <a:lstStyle/>
+          <a:p>
+            <a:r>
+              <a:rPr lang="en-US" sz="4000" b="1" dirty="0"/>
+              <a:t>is It Tasty?</a:t>
+            </a:r>
+          </a:p>
+          <a:p>
+            <a:endParaRPr lang="en-US" sz="4000" b="1" dirty="0"/>
+          </a:p>
+          <a:p>
+            <a:pPr marL="457200" indent="-457200">
+              <a:buFont typeface="Arial" panose="020B0604020202020204" pitchFamily="34" charset="0"/>
+              <a:buChar char="•"/>
+            </a:pPr>
+            <a:r>
+              <a:rPr lang="ru-RU" sz="2400" b="1" dirty="0"/>
+              <a:t>Что такое </a:t>
+            </a:r>
+            <a:r>
+              <a:rPr lang="en-US" sz="2400" b="1" dirty="0" err="1"/>
+              <a:t>zabbix</a:t>
+            </a:r>
+            <a:r>
+              <a:rPr lang="ru-RU" sz="2400" b="1" dirty="0"/>
+              <a:t>?</a:t>
+            </a:r>
+            <a:endParaRPr lang="en-US" sz="2400" b="1" dirty="0"/>
+          </a:p>
+          <a:p>
+            <a:pPr marL="457200" indent="-457200">
+              <a:buFont typeface="Arial" panose="020B0604020202020204" pitchFamily="34" charset="0"/>
+              <a:buChar char="•"/>
+            </a:pPr>
+            <a:r>
+              <a:rPr lang="ru-RU" sz="2400" b="1" dirty="0"/>
+              <a:t>Где мы можем использовать </a:t>
+            </a:r>
+            <a:r>
+              <a:rPr lang="en-US" sz="2400" b="1" dirty="0" err="1"/>
+              <a:t>zabbix</a:t>
+            </a:r>
+            <a:r>
+              <a:rPr lang="en-US" sz="2400" b="1" dirty="0"/>
+              <a:t>?</a:t>
+            </a:r>
+            <a:endParaRPr lang="ru-RU" sz="2400" b="1" dirty="0"/>
+          </a:p>
+          <a:p>
+            <a:pPr marL="457200" indent="-457200">
+              <a:buFont typeface="Arial" panose="020B0604020202020204" pitchFamily="34" charset="0"/>
+              <a:buChar char="•"/>
+            </a:pPr>
+            <a:r>
+              <a:rPr lang="ru-RU" sz="2400" b="1" dirty="0"/>
+              <a:t>Какие проблемы решает </a:t>
+            </a:r>
+            <a:r>
+              <a:rPr lang="en-US" sz="2400" b="1" dirty="0" err="1"/>
+              <a:t>zabbix</a:t>
+            </a:r>
+            <a:r>
+              <a:rPr lang="en-US" sz="2400" b="1" dirty="0"/>
+              <a:t>?</a:t>
+            </a:r>
+          </a:p>
+          <a:p>
+            <a:r>
+              <a:rPr lang="ru-RU" sz="2800" b="1" dirty="0"/>
+              <a:t> </a:t>
+            </a:r>
+            <a:endParaRPr lang="en-US" sz="2800" b="1" dirty="0"/>
+          </a:p>
+          <a:p>
+            <a:endParaRPr lang="en-US" sz="2800" b="1" dirty="0"/>
+          </a:p>
+          <a:p>
+            <a:pPr marL="457200" indent="-457200">
+              <a:buFont typeface="Arial" panose="020B0604020202020204" pitchFamily="34" charset="0"/>
+              <a:buChar char="•"/>
+            </a:pPr>
+            <a:endParaRPr lang="en-US" sz="2800" b="1" dirty="0"/>
+          </a:p>
+        </p:txBody>
+      </p:sp>
+    </p:spTree>
+    <p:extLst>
+      <p:ext uri="{BB962C8B-B14F-4D97-AF65-F5344CB8AC3E}">
+        <p14:creationId xmlns:p14="http://schemas.microsoft.com/office/powerpoint/2010/main" val="3946908765"/>
+      </p:ext>
+    </p:extLst>
+  </p:cSld>
+  <p:clrMapOvr>
+    <a:masterClrMapping/>
+  </p:clrMapOvr>
+</p:sld>
+</file>
+
+<file path=ppt/slides/slide7.xml><?xml version="1.0" encoding="utf-8"?>
+<p:sld xmlns:a="http://schemas.openxmlformats.org/drawingml/2006/main" xmlns:r="http://schemas.openxmlformats.org/officeDocument/2006/relationships" xmlns:p="http://schemas.openxmlformats.org/presentationml/2006/main">
+  <p:cSld>
+    <p:spTree>
+      <p:nvGrpSpPr>
+        <p:cNvPr id="1" name=""/>
+        <p:cNvGrpSpPr/>
+        <p:nvPr/>
+      </p:nvGrpSpPr>
+      <p:grpSpPr>
+        <a:xfrm>
+          <a:off x="0" y="0"/>
+          <a:ext cx="0" cy="0"/>
+          <a:chOff x="0" y="0"/>
+          <a:chExt cx="0" cy="0"/>
+        </a:xfrm>
+      </p:grpSpPr>
+      <p:sp>
+        <p:nvSpPr>
+          <p:cNvPr id="3" name="Subtitle 2">
+            <a:extLst>
+              <a:ext uri="{FF2B5EF4-FFF2-40B4-BE49-F238E27FC236}">
+                <a16:creationId xmlns:a16="http://schemas.microsoft.com/office/drawing/2014/main" id="{39E9CC7C-B571-4717-8C40-BBECA664A0B5}"/>
+              </a:ext>
+            </a:extLst>
+          </p:cNvPr>
+          <p:cNvSpPr>
+            <a:spLocks noGrp="1"/>
+          </p:cNvSpPr>
+          <p:nvPr>
+            <p:ph type="subTitle" idx="1"/>
+          </p:nvPr>
+        </p:nvSpPr>
+        <p:spPr>
+          <a:xfrm>
+            <a:off x="520137" y="485735"/>
             <a:ext cx="8825658" cy="494926"/>
           </a:xfrm>
         </p:spPr>
@@ -6422,6 +7951,10 @@
           </a:bodyPr>
           <a:lstStyle/>
           <a:p>
+            <a:r>
+              <a:rPr lang="ru-RU" sz="2800" b="1" dirty="0"/>
+              <a:t>Какие проблемы существуют?</a:t>
+            </a:r>
             <a:endParaRPr lang="en-US" sz="2800" b="1" dirty="0"/>
           </a:p>
         </p:txBody>
@@ -6429,7 +7962,181 @@
     </p:spTree>
     <p:extLst>
       <p:ext uri="{BB962C8B-B14F-4D97-AF65-F5344CB8AC3E}">
-        <p14:creationId xmlns:p14="http://schemas.microsoft.com/office/powerpoint/2010/main" val="1735809644"/>
+        <p14:creationId xmlns:p14="http://schemas.microsoft.com/office/powerpoint/2010/main" val="1580408681"/>
+      </p:ext>
+    </p:extLst>
+  </p:cSld>
+  <p:clrMapOvr>
+    <a:masterClrMapping/>
+  </p:clrMapOvr>
+</p:sld>
+</file>
+
+<file path=ppt/slides/slide8.xml><?xml version="1.0" encoding="utf-8"?>
+<p:sld xmlns:a="http://schemas.openxmlformats.org/drawingml/2006/main" xmlns:r="http://schemas.openxmlformats.org/officeDocument/2006/relationships" xmlns:p="http://schemas.openxmlformats.org/presentationml/2006/main">
+  <p:cSld>
+    <p:spTree>
+      <p:nvGrpSpPr>
+        <p:cNvPr id="1" name=""/>
+        <p:cNvGrpSpPr/>
+        <p:nvPr/>
+      </p:nvGrpSpPr>
+      <p:grpSpPr>
+        <a:xfrm>
+          <a:off x="0" y="0"/>
+          <a:ext cx="0" cy="0"/>
+          <a:chOff x="0" y="0"/>
+          <a:chExt cx="0" cy="0"/>
+        </a:xfrm>
+      </p:grpSpPr>
+      <p:sp>
+        <p:nvSpPr>
+          <p:cNvPr id="3" name="Subtitle 2">
+            <a:extLst>
+              <a:ext uri="{FF2B5EF4-FFF2-40B4-BE49-F238E27FC236}">
+                <a16:creationId xmlns:a16="http://schemas.microsoft.com/office/drawing/2014/main" id="{39E9CC7C-B571-4717-8C40-BBECA664A0B5}"/>
+              </a:ext>
+            </a:extLst>
+          </p:cNvPr>
+          <p:cNvSpPr>
+            <a:spLocks noGrp="1"/>
+          </p:cNvSpPr>
+          <p:nvPr>
+            <p:ph type="subTitle" idx="1"/>
+          </p:nvPr>
+        </p:nvSpPr>
+        <p:spPr>
+          <a:xfrm>
+            <a:off x="520137" y="485735"/>
+            <a:ext cx="8825658" cy="6201392"/>
+          </a:xfrm>
+        </p:spPr>
+        <p:txBody>
+          <a:bodyPr>
+            <a:normAutofit/>
+          </a:bodyPr>
+          <a:lstStyle/>
+          <a:p>
+            <a:r>
+              <a:rPr lang="en-US" sz="4000" b="1" dirty="0"/>
+              <a:t>Let’s talk about metrics</a:t>
+            </a:r>
+          </a:p>
+          <a:p>
+            <a:pPr marL="571500" indent="-571500">
+              <a:buFont typeface="Arial" panose="020B0604020202020204" pitchFamily="34" charset="0"/>
+              <a:buChar char="•"/>
+            </a:pPr>
+            <a:endParaRPr lang="ru-RU" sz="2400" b="1" dirty="0"/>
+          </a:p>
+          <a:p>
+            <a:pPr marL="571500" indent="-571500">
+              <a:buFont typeface="Arial" panose="020B0604020202020204" pitchFamily="34" charset="0"/>
+              <a:buChar char="•"/>
+            </a:pPr>
+            <a:r>
+              <a:rPr lang="ru-RU" sz="2400" b="1" dirty="0"/>
+              <a:t>Что такое метрики?</a:t>
+            </a:r>
+          </a:p>
+        </p:txBody>
+      </p:sp>
+    </p:spTree>
+    <p:extLst>
+      <p:ext uri="{BB962C8B-B14F-4D97-AF65-F5344CB8AC3E}">
+        <p14:creationId xmlns:p14="http://schemas.microsoft.com/office/powerpoint/2010/main" val="148099828"/>
+      </p:ext>
+    </p:extLst>
+  </p:cSld>
+  <p:clrMapOvr>
+    <a:masterClrMapping/>
+  </p:clrMapOvr>
+</p:sld>
+</file>
+
+<file path=ppt/slides/slide9.xml><?xml version="1.0" encoding="utf-8"?>
+<p:sld xmlns:a="http://schemas.openxmlformats.org/drawingml/2006/main" xmlns:r="http://schemas.openxmlformats.org/officeDocument/2006/relationships" xmlns:p="http://schemas.openxmlformats.org/presentationml/2006/main">
+  <p:cSld>
+    <p:spTree>
+      <p:nvGrpSpPr>
+        <p:cNvPr id="1" name=""/>
+        <p:cNvGrpSpPr/>
+        <p:nvPr/>
+      </p:nvGrpSpPr>
+      <p:grpSpPr>
+        <a:xfrm>
+          <a:off x="0" y="0"/>
+          <a:ext cx="0" cy="0"/>
+          <a:chOff x="0" y="0"/>
+          <a:chExt cx="0" cy="0"/>
+        </a:xfrm>
+      </p:grpSpPr>
+      <p:sp>
+        <p:nvSpPr>
+          <p:cNvPr id="3" name="Subtitle 2">
+            <a:extLst>
+              <a:ext uri="{FF2B5EF4-FFF2-40B4-BE49-F238E27FC236}">
+                <a16:creationId xmlns:a16="http://schemas.microsoft.com/office/drawing/2014/main" id="{39E9CC7C-B571-4717-8C40-BBECA664A0B5}"/>
+              </a:ext>
+            </a:extLst>
+          </p:cNvPr>
+          <p:cNvSpPr>
+            <a:spLocks noGrp="1"/>
+          </p:cNvSpPr>
+          <p:nvPr>
+            <p:ph type="subTitle" idx="1"/>
+          </p:nvPr>
+        </p:nvSpPr>
+        <p:spPr>
+          <a:xfrm>
+            <a:off x="520137" y="485735"/>
+            <a:ext cx="8825658" cy="6201392"/>
+          </a:xfrm>
+        </p:spPr>
+        <p:txBody>
+          <a:bodyPr>
+            <a:normAutofit/>
+          </a:bodyPr>
+          <a:lstStyle/>
+          <a:p>
+            <a:r>
+              <a:rPr lang="en-US" sz="4000" b="1" dirty="0"/>
+              <a:t>Let’s talk about metrics</a:t>
+            </a:r>
+          </a:p>
+          <a:p>
+            <a:pPr marL="571500" indent="-571500">
+              <a:buFont typeface="Arial" panose="020B0604020202020204" pitchFamily="34" charset="0"/>
+              <a:buChar char="•"/>
+            </a:pPr>
+            <a:endParaRPr lang="ru-RU" sz="2400" b="1" dirty="0"/>
+          </a:p>
+          <a:p>
+            <a:pPr marL="571500" indent="-571500">
+              <a:buFont typeface="Arial" panose="020B0604020202020204" pitchFamily="34" charset="0"/>
+              <a:buChar char="•"/>
+            </a:pPr>
+            <a:r>
+              <a:rPr lang="ru-RU" sz="2400" b="1" dirty="0"/>
+              <a:t>Что такое метрики?</a:t>
+            </a:r>
+          </a:p>
+          <a:p>
+            <a:pPr marL="571500" indent="-571500">
+              <a:buFont typeface="Arial" panose="020B0604020202020204" pitchFamily="34" charset="0"/>
+              <a:buChar char="•"/>
+            </a:pPr>
+            <a:r>
+              <a:rPr lang="ru-RU" sz="2400" b="1" dirty="0"/>
+              <a:t>Зачем они нужны?</a:t>
+            </a:r>
+          </a:p>
+        </p:txBody>
+      </p:sp>
+    </p:spTree>
+    <p:extLst>
+      <p:ext uri="{BB962C8B-B14F-4D97-AF65-F5344CB8AC3E}">
+        <p14:creationId xmlns:p14="http://schemas.microsoft.com/office/powerpoint/2010/main" val="1735646988"/>
       </p:ext>
     </p:extLst>
   </p:cSld>

</xml_diff>